<commit_message>
update: sample pptx files
</commit_message>
<xml_diff>
--- a/sample/processbar.pptx
+++ b/sample/processbar.pptx
@@ -3123,7 +3123,7 @@
           </a:fontRef>
         </p:style>
         <p:txBody>
-          <a:bodyPr rtlCol="0" anchor="ctr" wrap="square" tIns="0" lIns="0" bIns="762000" rIns="0"/>
+          <a:bodyPr rtlCol="0" anchor="ctr" wrap="none" tIns="0" lIns="0" bIns="762000" rIns="0"/>
           <a:lstStyle/>
           <a:p>
             <a:pPr algn="ctr">
@@ -3190,7 +3190,7 @@
           </a:fontRef>
         </p:style>
         <p:txBody>
-          <a:bodyPr rtlCol="0" anchor="ctr" wrap="square" tIns="0" lIns="0" bIns="0" rIns="0"/>
+          <a:bodyPr rtlCol="0" anchor="ctr" wrap="none" tIns="0" lIns="0" bIns="0" rIns="0"/>
           <a:lstStyle/>
           <a:p>
             <a:pPr algn="ctr">
@@ -3257,7 +3257,7 @@
           </a:fontRef>
         </p:style>
         <p:txBody>
-          <a:bodyPr rtlCol="0" anchor="ctr" wrap="square" tIns="0" lIns="0" bIns="0" rIns="0"/>
+          <a:bodyPr rtlCol="0" anchor="ctr" wrap="none" tIns="0" lIns="0" bIns="0" rIns="0"/>
           <a:lstStyle/>
           <a:p>
             <a:pPr algn="ctr">
@@ -3324,7 +3324,7 @@
           </a:fontRef>
         </p:style>
         <p:txBody>
-          <a:bodyPr rtlCol="0" anchor="ctr" wrap="square" tIns="0" lIns="0" bIns="0" rIns="0"/>
+          <a:bodyPr rtlCol="0" anchor="ctr" wrap="none" tIns="0" lIns="0" bIns="0" rIns="0"/>
           <a:lstStyle/>
           <a:p>
             <a:pPr algn="ctr">
@@ -3391,7 +3391,7 @@
           </a:fontRef>
         </p:style>
         <p:txBody>
-          <a:bodyPr rtlCol="0" anchor="ctr" wrap="square" tIns="0" lIns="0" bIns="0" rIns="0"/>
+          <a:bodyPr rtlCol="0" anchor="ctr" wrap="none" tIns="0" lIns="0" bIns="0" rIns="0"/>
           <a:lstStyle/>
           <a:p>
             <a:pPr algn="ctr">

</xml_diff>